<commit_message>
Update handout and presentation (time data and video embedded)
</commit_message>
<xml_diff>
--- a/final-presentation/Handout-Final.pptx
+++ b/final-presentation/Handout-Final.pptx
@@ -197,7 +197,7 @@
           <a:p>
             <a:fld id="{FA42B7E7-15B1-44ED-BBDA-7BD98B52DAB8}" type="datetimeFigureOut">
               <a:rPr lang="de-DE" smtClean="0"/>
-              <a:t>25.06.2020</a:t>
+              <a:t>28.06.2020</a:t>
             </a:fld>
             <a:endParaRPr lang="de-DE"/>
           </a:p>
@@ -611,7 +611,7 @@
           <a:p>
             <a:fld id="{DEC8DEED-FDD7-4752-82F5-D13F3FC20113}" type="datetimeFigureOut">
               <a:rPr lang="de-DE" smtClean="0"/>
-              <a:t>25.06.2020</a:t>
+              <a:t>28.06.2020</a:t>
             </a:fld>
             <a:endParaRPr lang="de-DE"/>
           </a:p>
@@ -809,7 +809,7 @@
           <a:p>
             <a:fld id="{DEC8DEED-FDD7-4752-82F5-D13F3FC20113}" type="datetimeFigureOut">
               <a:rPr lang="de-DE" smtClean="0"/>
-              <a:t>25.06.2020</a:t>
+              <a:t>28.06.2020</a:t>
             </a:fld>
             <a:endParaRPr lang="de-DE"/>
           </a:p>
@@ -1017,7 +1017,7 @@
           <a:p>
             <a:fld id="{DEC8DEED-FDD7-4752-82F5-D13F3FC20113}" type="datetimeFigureOut">
               <a:rPr lang="de-DE" smtClean="0"/>
-              <a:t>25.06.2020</a:t>
+              <a:t>28.06.2020</a:t>
             </a:fld>
             <a:endParaRPr lang="de-DE"/>
           </a:p>
@@ -1215,7 +1215,7 @@
           <a:p>
             <a:fld id="{DEC8DEED-FDD7-4752-82F5-D13F3FC20113}" type="datetimeFigureOut">
               <a:rPr lang="de-DE" smtClean="0"/>
-              <a:t>25.06.2020</a:t>
+              <a:t>28.06.2020</a:t>
             </a:fld>
             <a:endParaRPr lang="de-DE"/>
           </a:p>
@@ -1490,7 +1490,7 @@
           <a:p>
             <a:fld id="{DEC8DEED-FDD7-4752-82F5-D13F3FC20113}" type="datetimeFigureOut">
               <a:rPr lang="de-DE" smtClean="0"/>
-              <a:t>25.06.2020</a:t>
+              <a:t>28.06.2020</a:t>
             </a:fld>
             <a:endParaRPr lang="de-DE"/>
           </a:p>
@@ -1755,7 +1755,7 @@
           <a:p>
             <a:fld id="{DEC8DEED-FDD7-4752-82F5-D13F3FC20113}" type="datetimeFigureOut">
               <a:rPr lang="de-DE" smtClean="0"/>
-              <a:t>25.06.2020</a:t>
+              <a:t>28.06.2020</a:t>
             </a:fld>
             <a:endParaRPr lang="de-DE"/>
           </a:p>
@@ -2167,7 +2167,7 @@
           <a:p>
             <a:fld id="{DEC8DEED-FDD7-4752-82F5-D13F3FC20113}" type="datetimeFigureOut">
               <a:rPr lang="de-DE" smtClean="0"/>
-              <a:t>25.06.2020</a:t>
+              <a:t>28.06.2020</a:t>
             </a:fld>
             <a:endParaRPr lang="de-DE"/>
           </a:p>
@@ -2308,7 +2308,7 @@
           <a:p>
             <a:fld id="{DEC8DEED-FDD7-4752-82F5-D13F3FC20113}" type="datetimeFigureOut">
               <a:rPr lang="de-DE" smtClean="0"/>
-              <a:t>25.06.2020</a:t>
+              <a:t>28.06.2020</a:t>
             </a:fld>
             <a:endParaRPr lang="de-DE"/>
           </a:p>
@@ -2421,7 +2421,7 @@
           <a:p>
             <a:fld id="{DEC8DEED-FDD7-4752-82F5-D13F3FC20113}" type="datetimeFigureOut">
               <a:rPr lang="de-DE" smtClean="0"/>
-              <a:t>25.06.2020</a:t>
+              <a:t>28.06.2020</a:t>
             </a:fld>
             <a:endParaRPr lang="de-DE"/>
           </a:p>
@@ -2732,7 +2732,7 @@
           <a:p>
             <a:fld id="{DEC8DEED-FDD7-4752-82F5-D13F3FC20113}" type="datetimeFigureOut">
               <a:rPr lang="de-DE" smtClean="0"/>
-              <a:t>25.06.2020</a:t>
+              <a:t>28.06.2020</a:t>
             </a:fld>
             <a:endParaRPr lang="de-DE"/>
           </a:p>
@@ -3020,7 +3020,7 @@
           <a:p>
             <a:fld id="{DEC8DEED-FDD7-4752-82F5-D13F3FC20113}" type="datetimeFigureOut">
               <a:rPr lang="de-DE" smtClean="0"/>
-              <a:t>25.06.2020</a:t>
+              <a:t>28.06.2020</a:t>
             </a:fld>
             <a:endParaRPr lang="de-DE"/>
           </a:p>
@@ -3261,7 +3261,7 @@
           <a:p>
             <a:fld id="{DEC8DEED-FDD7-4752-82F5-D13F3FC20113}" type="datetimeFigureOut">
               <a:rPr lang="de-DE" smtClean="0"/>
-              <a:t>25.06.2020</a:t>
+              <a:t>28.06.2020</a:t>
             </a:fld>
             <a:endParaRPr lang="de-DE"/>
           </a:p>
@@ -3903,7 +3903,7 @@
           <p:nvPr>
             <p:extLst>
               <p:ext uri="{D42A27DB-BD31-4B8C-83A1-F6EECF244321}">
-                <p14:modId xmlns:p14="http://schemas.microsoft.com/office/powerpoint/2010/main" val="434400151"/>
+                <p14:modId xmlns:p14="http://schemas.microsoft.com/office/powerpoint/2010/main" val="124715714"/>
               </p:ext>
             </p:extLst>
           </p:nvPr>
@@ -4175,7 +4175,7 @@
                     <a:p>
                       <a:r>
                         <a:rPr lang="de-DE" sz="1000" dirty="0"/>
-                        <a:t>TODO</a:t>
+                        <a:t>156,5</a:t>
                       </a:r>
                     </a:p>
                   </a:txBody>
@@ -4188,7 +4188,7 @@
                     <a:p>
                       <a:r>
                         <a:rPr lang="de-DE" sz="1000" dirty="0"/>
-                        <a:t>TODO</a:t>
+                        <a:t>19,25</a:t>
                       </a:r>
                     </a:p>
                   </a:txBody>
@@ -4201,7 +4201,7 @@
                     <a:p>
                       <a:r>
                         <a:rPr lang="de-DE" sz="1000" dirty="0"/>
-                        <a:t>TODO</a:t>
+                        <a:t>20,25</a:t>
                       </a:r>
                     </a:p>
                   </a:txBody>
@@ -4214,7 +4214,7 @@
                     <a:p>
                       <a:r>
                         <a:rPr lang="de-DE" sz="1000" dirty="0"/>
-                        <a:t>TODO</a:t>
+                        <a:t>109</a:t>
                       </a:r>
                     </a:p>
                   </a:txBody>
@@ -4227,7 +4227,7 @@
                     <a:p>
                       <a:r>
                         <a:rPr lang="de-DE" sz="1000" dirty="0"/>
-                        <a:t>TODO</a:t>
+                        <a:t>8</a:t>
                       </a:r>
                     </a:p>
                   </a:txBody>
@@ -4280,7 +4280,7 @@
                     <a:p>
                       <a:r>
                         <a:rPr lang="de-DE" sz="1000" dirty="0"/>
-                        <a:t>TODO</a:t>
+                        <a:t>106,25</a:t>
                       </a:r>
                     </a:p>
                   </a:txBody>
@@ -4293,7 +4293,7 @@
                     <a:p>
                       <a:r>
                         <a:rPr lang="de-DE" sz="1000" dirty="0"/>
-                        <a:t>TODO</a:t>
+                        <a:t>26,25</a:t>
                       </a:r>
                     </a:p>
                   </a:txBody>
@@ -4306,7 +4306,7 @@
                     <a:p>
                       <a:r>
                         <a:rPr lang="de-DE" sz="1000" dirty="0"/>
-                        <a:t>TODO</a:t>
+                        <a:t>27,25</a:t>
                       </a:r>
                     </a:p>
                   </a:txBody>
@@ -4319,7 +4319,7 @@
                     <a:p>
                       <a:r>
                         <a:rPr lang="de-DE" sz="1000" dirty="0"/>
-                        <a:t>TODO</a:t>
+                        <a:t>47,25</a:t>
                       </a:r>
                     </a:p>
                   </a:txBody>
@@ -4332,7 +4332,7 @@
                     <a:p>
                       <a:r>
                         <a:rPr lang="de-DE" sz="1000" dirty="0"/>
-                        <a:t>TODO</a:t>
+                        <a:t>5,5</a:t>
                       </a:r>
                     </a:p>
                   </a:txBody>
@@ -4394,7 +4394,7 @@
                     <a:p>
                       <a:r>
                         <a:rPr lang="de-DE" sz="1000" dirty="0"/>
-                        <a:t>TODO</a:t>
+                        <a:t>194,16</a:t>
                       </a:r>
                     </a:p>
                   </a:txBody>
@@ -4417,7 +4417,7 @@
                     <a:p>
                       <a:r>
                         <a:rPr lang="de-DE" sz="1000" dirty="0"/>
-                        <a:t>TODO</a:t>
+                        <a:t>67,91</a:t>
                       </a:r>
                     </a:p>
                   </a:txBody>
@@ -4440,7 +4440,7 @@
                     <a:p>
                       <a:r>
                         <a:rPr lang="de-DE" sz="1000" dirty="0"/>
-                        <a:t>TODO</a:t>
+                        <a:t>42,75</a:t>
                       </a:r>
                     </a:p>
                   </a:txBody>
@@ -4463,7 +4463,7 @@
                     <a:p>
                       <a:r>
                         <a:rPr lang="de-DE" sz="1000" dirty="0"/>
-                        <a:t>TODO</a:t>
+                        <a:t>56,75</a:t>
                       </a:r>
                     </a:p>
                   </a:txBody>
@@ -4486,7 +4486,7 @@
                     <a:p>
                       <a:r>
                         <a:rPr lang="de-DE" sz="1000" dirty="0"/>
-                        <a:t>TODO</a:t>
+                        <a:t>26,75</a:t>
                       </a:r>
                     </a:p>
                   </a:txBody>
@@ -4536,7 +4536,7 @@
           <p:nvPr>
             <p:extLst>
               <p:ext uri="{D42A27DB-BD31-4B8C-83A1-F6EECF244321}">
-                <p14:modId xmlns:p14="http://schemas.microsoft.com/office/powerpoint/2010/main" val="448423990"/>
+                <p14:modId xmlns:p14="http://schemas.microsoft.com/office/powerpoint/2010/main" val="626232822"/>
               </p:ext>
             </p:extLst>
           </p:nvPr>
@@ -4669,7 +4669,7 @@
                     <a:p>
                       <a:r>
                         <a:rPr lang="de-DE" sz="1000" dirty="0"/>
-                        <a:t>TODO</a:t>
+                        <a:t>113,41</a:t>
                       </a:r>
                     </a:p>
                   </a:txBody>
@@ -4722,7 +4722,7 @@
                     <a:p>
                       <a:r>
                         <a:rPr lang="de-DE" sz="1000" dirty="0"/>
-                        <a:t>TODO</a:t>
+                        <a:t>90,25</a:t>
                       </a:r>
                     </a:p>
                   </a:txBody>
@@ -4775,7 +4775,7 @@
                     <a:p>
                       <a:r>
                         <a:rPr lang="de-DE" sz="1000" dirty="0"/>
-                        <a:t>TODO</a:t>
+                        <a:t>213</a:t>
                       </a:r>
                     </a:p>
                   </a:txBody>
@@ -4838,7 +4838,7 @@
                     <a:p>
                       <a:r>
                         <a:rPr lang="de-DE" sz="1000" dirty="0"/>
-                        <a:t>TODO</a:t>
+                        <a:t>40,25</a:t>
                       </a:r>
                     </a:p>
                   </a:txBody>

</xml_diff>